<commit_message>
add image to the final presentation template and html
</commit_message>
<xml_diff>
--- a/backend/powerpoint/templates/template1Final.pptx
+++ b/backend/powerpoint/templates/template1Final.pptx
@@ -197,7 +197,7 @@
           <a:p>
             <a:fld id="{870CC9C5-3247-4881-93EA-827EC4A1B973}" type="datetimeFigureOut">
               <a:rPr lang="en-GB" smtClean="0"/>
-              <a:t>15/02/2025</a:t>
+              <a:t>17/02/2025</a:t>
             </a:fld>
             <a:endParaRPr lang="en-GB"/>
           </a:p>
@@ -660,7 +660,7 @@
           <a:p>
             <a:fld id="{FEBFF904-F2FC-44B1-B43E-CB1CA4DC4CA9}" type="datetime1">
               <a:rPr lang="en-GB" smtClean="0"/>
-              <a:t>15/02/2025</a:t>
+              <a:t>17/02/2025</a:t>
             </a:fld>
             <a:endParaRPr lang="en-GB"/>
           </a:p>
@@ -941,7 +941,7 @@
           <a:p>
             <a:fld id="{3B192CD6-5CA0-4FE4-BECD-124F6938392F}" type="datetime1">
               <a:rPr lang="en-GB" smtClean="0"/>
-              <a:t>15/02/2025</a:t>
+              <a:t>17/02/2025</a:t>
             </a:fld>
             <a:endParaRPr lang="en-GB"/>
           </a:p>
@@ -1133,7 +1133,7 @@
           <a:p>
             <a:fld id="{FBEF7C8E-40FA-48A5-A31D-4409170EAF57}" type="datetime1">
               <a:rPr lang="en-GB" smtClean="0"/>
-              <a:t>15/02/2025</a:t>
+              <a:t>17/02/2025</a:t>
             </a:fld>
             <a:endParaRPr lang="en-GB"/>
           </a:p>
@@ -1394,7 +1394,7 @@
           <a:p>
             <a:fld id="{1778426D-CFCF-477A-BFB2-E5C3A81B9699}" type="datetime1">
               <a:rPr lang="en-GB" smtClean="0"/>
-              <a:t>15/02/2025</a:t>
+              <a:t>17/02/2025</a:t>
             </a:fld>
             <a:endParaRPr lang="en-GB"/>
           </a:p>
@@ -1820,7 +1820,7 @@
           <a:p>
             <a:fld id="{562F7DCD-054A-46B6-969D-786A70B73437}" type="datetime1">
               <a:rPr lang="en-GB" smtClean="0"/>
-              <a:t>15/02/2025</a:t>
+              <a:t>17/02/2025</a:t>
             </a:fld>
             <a:endParaRPr lang="en-GB"/>
           </a:p>
@@ -2366,7 +2366,7 @@
           <a:p>
             <a:fld id="{71D9CBD8-4758-492A-A2A3-9FD0A4C920D4}" type="datetime1">
               <a:rPr lang="en-GB" smtClean="0"/>
-              <a:t>15/02/2025</a:t>
+              <a:t>17/02/2025</a:t>
             </a:fld>
             <a:endParaRPr lang="en-GB"/>
           </a:p>
@@ -3197,7 +3197,7 @@
           <a:p>
             <a:fld id="{3B13688B-08D2-4869-814F-77D13FA477E7}" type="datetime1">
               <a:rPr lang="en-GB" smtClean="0"/>
-              <a:t>15/02/2025</a:t>
+              <a:t>17/02/2025</a:t>
             </a:fld>
             <a:endParaRPr lang="en-GB"/>
           </a:p>
@@ -3367,7 +3367,7 @@
           <a:p>
             <a:fld id="{A7F01AB9-881B-4D32-8098-63D8EE43798E}" type="datetime1">
               <a:rPr lang="en-GB" smtClean="0"/>
-              <a:t>15/02/2025</a:t>
+              <a:t>17/02/2025</a:t>
             </a:fld>
             <a:endParaRPr lang="en-GB"/>
           </a:p>
@@ -3547,7 +3547,7 @@
           <a:p>
             <a:fld id="{6BB3DA4D-9E84-4BA2-86EA-732034ABB9B4}" type="datetime1">
               <a:rPr lang="en-GB" smtClean="0"/>
-              <a:t>15/02/2025</a:t>
+              <a:t>17/02/2025</a:t>
             </a:fld>
             <a:endParaRPr lang="en-GB"/>
           </a:p>
@@ -3717,7 +3717,7 @@
           <a:p>
             <a:fld id="{5436715F-F413-47D4-8CBA-8B84BE9F51D8}" type="datetime1">
               <a:rPr lang="en-GB" smtClean="0"/>
-              <a:t>15/02/2025</a:t>
+              <a:t>17/02/2025</a:t>
             </a:fld>
             <a:endParaRPr lang="en-GB"/>
           </a:p>
@@ -3974,7 +3974,7 @@
           <a:p>
             <a:fld id="{2E40C26F-2385-4DCA-A233-934715856DD8}" type="datetime1">
               <a:rPr lang="en-GB" smtClean="0"/>
-              <a:t>15/02/2025</a:t>
+              <a:t>17/02/2025</a:t>
             </a:fld>
             <a:endParaRPr lang="en-GB"/>
           </a:p>
@@ -4206,7 +4206,7 @@
           <a:p>
             <a:fld id="{02551839-9C6E-4AFA-A77A-EFF7591ABD9F}" type="datetime1">
               <a:rPr lang="en-GB" smtClean="0"/>
-              <a:t>15/02/2025</a:t>
+              <a:t>17/02/2025</a:t>
             </a:fld>
             <a:endParaRPr lang="en-GB"/>
           </a:p>
@@ -4599,7 +4599,7 @@
           <a:p>
             <a:fld id="{A08CEAB6-1322-438C-8456-FF1424EBCBE0}" type="datetime1">
               <a:rPr lang="en-GB" smtClean="0"/>
-              <a:t>15/02/2025</a:t>
+              <a:t>17/02/2025</a:t>
             </a:fld>
             <a:endParaRPr lang="en-GB"/>
           </a:p>
@@ -4717,7 +4717,7 @@
           <a:p>
             <a:fld id="{4B3885A3-CBB0-42F5-8367-8C61CA538BB9}" type="datetime1">
               <a:rPr lang="en-GB" smtClean="0"/>
-              <a:t>15/02/2025</a:t>
+              <a:t>17/02/2025</a:t>
             </a:fld>
             <a:endParaRPr lang="en-GB"/>
           </a:p>
@@ -4812,7 +4812,7 @@
           <a:p>
             <a:fld id="{2EE8FF3B-CCD0-4512-B0A3-91E2F9BBBC9A}" type="datetime1">
               <a:rPr lang="en-GB" smtClean="0"/>
-              <a:t>15/02/2025</a:t>
+              <a:t>17/02/2025</a:t>
             </a:fld>
             <a:endParaRPr lang="en-GB"/>
           </a:p>
@@ -5085,7 +5085,7 @@
           <a:p>
             <a:fld id="{4592F7CD-8F55-4E9D-B1E9-CD64F3D4D60C}" type="datetime1">
               <a:rPr lang="en-GB" smtClean="0"/>
-              <a:t>15/02/2025</a:t>
+              <a:t>17/02/2025</a:t>
             </a:fld>
             <a:endParaRPr lang="en-GB"/>
           </a:p>
@@ -5366,7 +5366,7 @@
           <a:p>
             <a:fld id="{4A62C000-05F7-48E1-8091-A26E7E5100BC}" type="datetime1">
               <a:rPr lang="en-GB" smtClean="0"/>
-              <a:t>15/02/2025</a:t>
+              <a:t>17/02/2025</a:t>
             </a:fld>
             <a:endParaRPr lang="en-GB"/>
           </a:p>
@@ -5606,7 +5606,7 @@
           <a:p>
             <a:fld id="{A6167571-A7EE-46D1-89BA-B10F682DEF10}" type="datetime1">
               <a:rPr lang="en-GB" smtClean="0"/>
-              <a:t>15/02/2025</a:t>
+              <a:t>17/02/2025</a:t>
             </a:fld>
             <a:endParaRPr lang="en-GB"/>
           </a:p>
@@ -6204,26 +6204,39 @@
           </a:p>
         </p:txBody>
       </p:sp>
-      <p:sp>
-        <p:nvSpPr>
-          <p:cNvPr id="4" name="Picture Placeholder 3">
+      <p:pic>
+        <p:nvPicPr>
+          <p:cNvPr id="6" name="Picture Placeholder 5" descr="Tree frog">
             <a:extLst>
               <a:ext uri="{FF2B5EF4-FFF2-40B4-BE49-F238E27FC236}">
-                <a16:creationId xmlns:a16="http://schemas.microsoft.com/office/drawing/2014/main" id="{0C18929A-C36C-0007-31AF-3D7955674590}"/>
+                <a16:creationId xmlns:a16="http://schemas.microsoft.com/office/drawing/2014/main" id="{5CDEDFBB-959E-279D-97CB-F744EF20307C}"/>
               </a:ext>
             </a:extLst>
           </p:cNvPr>
-          <p:cNvSpPr>
-            <a:spLocks noGrp="1"/>
-          </p:cNvSpPr>
+          <p:cNvPicPr>
+            <a:picLocks noGrp="1" noChangeAspect="1"/>
+          </p:cNvPicPr>
           <p:nvPr>
             <p:ph type="pic" idx="15"/>
           </p:nvPr>
-        </p:nvSpPr>
+        </p:nvPicPr>
+        <p:blipFill>
+          <a:blip r:embed="rId2">
+            <a:extLst>
+              <a:ext uri="{28A0092B-C50C-407E-A947-70E740481C1C}">
+                <a14:useLocalDpi xmlns:a14="http://schemas.microsoft.com/office/drawing/2010/main" val="0"/>
+              </a:ext>
+            </a:extLst>
+          </a:blip>
+          <a:srcRect t="3705" b="3705"/>
+          <a:stretch>
+            <a:fillRect/>
+          </a:stretch>
+        </p:blipFill>
         <p:spPr>
           <a:xfrm>
-            <a:off x="7502051" y="570271"/>
-            <a:ext cx="3952530" cy="2438400"/>
+            <a:off x="7502525" y="569913"/>
+            <a:ext cx="3951288" cy="2438400"/>
           </a:xfrm>
           <a:prstGeom prst="roundRect">
             <a:avLst>
@@ -6231,14 +6244,7 @@
             </a:avLst>
           </a:prstGeom>
         </p:spPr>
-        <p:txBody>
-          <a:bodyPr/>
-          <a:lstStyle/>
-          <a:p>
-            <a:endParaRPr lang="en-GB" dirty="0"/>
-          </a:p>
-        </p:txBody>
-      </p:sp>
+      </p:pic>
       <p:sp>
         <p:nvSpPr>
           <p:cNvPr id="5" name="Text Placeholder 4">
@@ -6320,7 +6326,7 @@
           <p:nvPr/>
         </p:nvPicPr>
         <p:blipFill rotWithShape="1">
-          <a:blip r:embed="rId2"/>
+          <a:blip r:embed="rId3"/>
           <a:srcRect t="1307" r="5814" b="1"/>
           <a:stretch/>
         </p:blipFill>

</xml_diff>

<commit_message>
Added list creater for persons involved
</commit_message>
<xml_diff>
--- a/backend/powerpoint/templates/template1Final.pptx
+++ b/backend/powerpoint/templates/template1Final.pptx
@@ -197,7 +197,7 @@
           <a:p>
             <a:fld id="{870CC9C5-3247-4881-93EA-827EC4A1B973}" type="datetimeFigureOut">
               <a:rPr lang="en-GB" smtClean="0"/>
-              <a:t>17/02/2025</a:t>
+              <a:t>19/02/2025</a:t>
             </a:fld>
             <a:endParaRPr lang="en-GB"/>
           </a:p>
@@ -660,7 +660,7 @@
           <a:p>
             <a:fld id="{FEBFF904-F2FC-44B1-B43E-CB1CA4DC4CA9}" type="datetime1">
               <a:rPr lang="en-GB" smtClean="0"/>
-              <a:t>17/02/2025</a:t>
+              <a:t>19/02/2025</a:t>
             </a:fld>
             <a:endParaRPr lang="en-GB"/>
           </a:p>
@@ -941,7 +941,7 @@
           <a:p>
             <a:fld id="{3B192CD6-5CA0-4FE4-BECD-124F6938392F}" type="datetime1">
               <a:rPr lang="en-GB" smtClean="0"/>
-              <a:t>17/02/2025</a:t>
+              <a:t>19/02/2025</a:t>
             </a:fld>
             <a:endParaRPr lang="en-GB"/>
           </a:p>
@@ -1133,7 +1133,7 @@
           <a:p>
             <a:fld id="{FBEF7C8E-40FA-48A5-A31D-4409170EAF57}" type="datetime1">
               <a:rPr lang="en-GB" smtClean="0"/>
-              <a:t>17/02/2025</a:t>
+              <a:t>19/02/2025</a:t>
             </a:fld>
             <a:endParaRPr lang="en-GB"/>
           </a:p>
@@ -1394,7 +1394,7 @@
           <a:p>
             <a:fld id="{1778426D-CFCF-477A-BFB2-E5C3A81B9699}" type="datetime1">
               <a:rPr lang="en-GB" smtClean="0"/>
-              <a:t>17/02/2025</a:t>
+              <a:t>19/02/2025</a:t>
             </a:fld>
             <a:endParaRPr lang="en-GB"/>
           </a:p>
@@ -1820,7 +1820,7 @@
           <a:p>
             <a:fld id="{562F7DCD-054A-46B6-969D-786A70B73437}" type="datetime1">
               <a:rPr lang="en-GB" smtClean="0"/>
-              <a:t>17/02/2025</a:t>
+              <a:t>19/02/2025</a:t>
             </a:fld>
             <a:endParaRPr lang="en-GB"/>
           </a:p>
@@ -2366,7 +2366,7 @@
           <a:p>
             <a:fld id="{71D9CBD8-4758-492A-A2A3-9FD0A4C920D4}" type="datetime1">
               <a:rPr lang="en-GB" smtClean="0"/>
-              <a:t>17/02/2025</a:t>
+              <a:t>19/02/2025</a:t>
             </a:fld>
             <a:endParaRPr lang="en-GB"/>
           </a:p>
@@ -3197,7 +3197,7 @@
           <a:p>
             <a:fld id="{3B13688B-08D2-4869-814F-77D13FA477E7}" type="datetime1">
               <a:rPr lang="en-GB" smtClean="0"/>
-              <a:t>17/02/2025</a:t>
+              <a:t>19/02/2025</a:t>
             </a:fld>
             <a:endParaRPr lang="en-GB"/>
           </a:p>
@@ -3367,7 +3367,7 @@
           <a:p>
             <a:fld id="{A7F01AB9-881B-4D32-8098-63D8EE43798E}" type="datetime1">
               <a:rPr lang="en-GB" smtClean="0"/>
-              <a:t>17/02/2025</a:t>
+              <a:t>19/02/2025</a:t>
             </a:fld>
             <a:endParaRPr lang="en-GB"/>
           </a:p>
@@ -3547,7 +3547,7 @@
           <a:p>
             <a:fld id="{6BB3DA4D-9E84-4BA2-86EA-732034ABB9B4}" type="datetime1">
               <a:rPr lang="en-GB" smtClean="0"/>
-              <a:t>17/02/2025</a:t>
+              <a:t>19/02/2025</a:t>
             </a:fld>
             <a:endParaRPr lang="en-GB"/>
           </a:p>
@@ -3717,7 +3717,7 @@
           <a:p>
             <a:fld id="{5436715F-F413-47D4-8CBA-8B84BE9F51D8}" type="datetime1">
               <a:rPr lang="en-GB" smtClean="0"/>
-              <a:t>17/02/2025</a:t>
+              <a:t>19/02/2025</a:t>
             </a:fld>
             <a:endParaRPr lang="en-GB"/>
           </a:p>
@@ -3974,7 +3974,7 @@
           <a:p>
             <a:fld id="{2E40C26F-2385-4DCA-A233-934715856DD8}" type="datetime1">
               <a:rPr lang="en-GB" smtClean="0"/>
-              <a:t>17/02/2025</a:t>
+              <a:t>19/02/2025</a:t>
             </a:fld>
             <a:endParaRPr lang="en-GB"/>
           </a:p>
@@ -4206,7 +4206,7 @@
           <a:p>
             <a:fld id="{02551839-9C6E-4AFA-A77A-EFF7591ABD9F}" type="datetime1">
               <a:rPr lang="en-GB" smtClean="0"/>
-              <a:t>17/02/2025</a:t>
+              <a:t>19/02/2025</a:t>
             </a:fld>
             <a:endParaRPr lang="en-GB"/>
           </a:p>
@@ -4599,7 +4599,7 @@
           <a:p>
             <a:fld id="{A08CEAB6-1322-438C-8456-FF1424EBCBE0}" type="datetime1">
               <a:rPr lang="en-GB" smtClean="0"/>
-              <a:t>17/02/2025</a:t>
+              <a:t>19/02/2025</a:t>
             </a:fld>
             <a:endParaRPr lang="en-GB"/>
           </a:p>
@@ -4717,7 +4717,7 @@
           <a:p>
             <a:fld id="{4B3885A3-CBB0-42F5-8367-8C61CA538BB9}" type="datetime1">
               <a:rPr lang="en-GB" smtClean="0"/>
-              <a:t>17/02/2025</a:t>
+              <a:t>19/02/2025</a:t>
             </a:fld>
             <a:endParaRPr lang="en-GB"/>
           </a:p>
@@ -4812,7 +4812,7 @@
           <a:p>
             <a:fld id="{2EE8FF3B-CCD0-4512-B0A3-91E2F9BBBC9A}" type="datetime1">
               <a:rPr lang="en-GB" smtClean="0"/>
-              <a:t>17/02/2025</a:t>
+              <a:t>19/02/2025</a:t>
             </a:fld>
             <a:endParaRPr lang="en-GB"/>
           </a:p>
@@ -5085,7 +5085,7 @@
           <a:p>
             <a:fld id="{4592F7CD-8F55-4E9D-B1E9-CD64F3D4D60C}" type="datetime1">
               <a:rPr lang="en-GB" smtClean="0"/>
-              <a:t>17/02/2025</a:t>
+              <a:t>19/02/2025</a:t>
             </a:fld>
             <a:endParaRPr lang="en-GB"/>
           </a:p>
@@ -5366,7 +5366,7 @@
           <a:p>
             <a:fld id="{4A62C000-05F7-48E1-8091-A26E7E5100BC}" type="datetime1">
               <a:rPr lang="en-GB" smtClean="0"/>
-              <a:t>17/02/2025</a:t>
+              <a:t>19/02/2025</a:t>
             </a:fld>
             <a:endParaRPr lang="en-GB"/>
           </a:p>
@@ -5606,7 +5606,7 @@
           <a:p>
             <a:fld id="{A6167571-A7EE-46D1-89BA-B10F682DEF10}" type="datetime1">
               <a:rPr lang="en-GB" smtClean="0"/>
-              <a:t>17/02/2025</a:t>
+              <a:t>19/02/2025</a:t>
             </a:fld>
             <a:endParaRPr lang="en-GB"/>
           </a:p>
@@ -6296,7 +6296,7 @@
         </p:nvSpPr>
         <p:spPr>
           <a:xfrm>
-            <a:off x="7502051" y="3234814"/>
+            <a:off x="7502525" y="3318987"/>
             <a:ext cx="4442050" cy="2890684"/>
           </a:xfrm>
         </p:spPr>
@@ -6304,6 +6304,10 @@
           <a:bodyPr/>
           <a:lstStyle/>
           <a:p>
+            <a:pPr marL="285750" indent="-285750">
+              <a:buFont typeface="Arial" panose="020B0604020202020204" pitchFamily="34" charset="0"/>
+              <a:buChar char="•"/>
+            </a:pPr>
             <a:r>
               <a:rPr lang="en-GB" dirty="0"/>
               <a:t>People</a:t>

</xml_diff>